<commit_message>
Included the architecture in the tech stack and development environment presentation.
</commit_message>
<xml_diff>
--- a/docs/Meetings/3/3.pptx
+++ b/docs/Meetings/3/3.pptx
@@ -7,14 +7,15 @@
   <p:sldIdLst>
     <p:sldId id="256" r:id="rId2"/>
     <p:sldId id="259" r:id="rId3"/>
-    <p:sldId id="257" r:id="rId4"/>
-    <p:sldId id="258" r:id="rId5"/>
-    <p:sldId id="260" r:id="rId6"/>
-    <p:sldId id="261" r:id="rId7"/>
-    <p:sldId id="262" r:id="rId8"/>
-    <p:sldId id="264" r:id="rId9"/>
-    <p:sldId id="263" r:id="rId10"/>
-    <p:sldId id="265" r:id="rId11"/>
+    <p:sldId id="266" r:id="rId4"/>
+    <p:sldId id="257" r:id="rId5"/>
+    <p:sldId id="258" r:id="rId6"/>
+    <p:sldId id="260" r:id="rId7"/>
+    <p:sldId id="261" r:id="rId8"/>
+    <p:sldId id="262" r:id="rId9"/>
+    <p:sldId id="264" r:id="rId10"/>
+    <p:sldId id="263" r:id="rId11"/>
+    <p:sldId id="265" r:id="rId12"/>
   </p:sldIdLst>
   <p:sldSz cx="12192000" cy="6858000"/>
   <p:notesSz cx="6858000" cy="9144000"/>
@@ -13338,6 +13339,98 @@
 </file>
 
 <file path=ppt/slides/slide10.xml><?xml version="1.0" encoding="utf-8"?>
+<p:sld xmlns:a="http://schemas.openxmlformats.org/drawingml/2006/main" xmlns:r="http://schemas.openxmlformats.org/officeDocument/2006/relationships" xmlns:p="http://schemas.openxmlformats.org/presentationml/2006/main">
+  <p:cSld>
+    <p:spTree>
+      <p:nvGrpSpPr>
+        <p:cNvPr id="1" name=""/>
+        <p:cNvGrpSpPr/>
+        <p:nvPr/>
+      </p:nvGrpSpPr>
+      <p:grpSpPr>
+        <a:xfrm>
+          <a:off x="0" y="0"/>
+          <a:ext cx="0" cy="0"/>
+          <a:chOff x="0" y="0"/>
+          <a:chExt cx="0" cy="0"/>
+        </a:xfrm>
+      </p:grpSpPr>
+      <p:sp>
+        <p:nvSpPr>
+          <p:cNvPr id="2" name="Title 1">
+            <a:extLst>
+              <a:ext uri="{FF2B5EF4-FFF2-40B4-BE49-F238E27FC236}">
+                <a16:creationId xmlns:a16="http://schemas.microsoft.com/office/drawing/2014/main" id="{9C19C53D-9C92-A64D-8625-66CF0ABA07FA}"/>
+              </a:ext>
+            </a:extLst>
+          </p:cNvPr>
+          <p:cNvSpPr>
+            <a:spLocks noGrp="1"/>
+          </p:cNvSpPr>
+          <p:nvPr>
+            <p:ph type="title"/>
+          </p:nvPr>
+        </p:nvSpPr>
+        <p:spPr/>
+        <p:txBody>
+          <a:bodyPr/>
+          <a:lstStyle/>
+          <a:p>
+            <a:r>
+              <a:rPr lang="en-US" dirty="0"/>
+              <a:t>Development Environment</a:t>
+            </a:r>
+          </a:p>
+        </p:txBody>
+      </p:sp>
+      <p:sp>
+        <p:nvSpPr>
+          <p:cNvPr id="3" name="Content Placeholder 2">
+            <a:extLst>
+              <a:ext uri="{FF2B5EF4-FFF2-40B4-BE49-F238E27FC236}">
+                <a16:creationId xmlns:a16="http://schemas.microsoft.com/office/drawing/2014/main" id="{ED21F778-FE24-9E4F-87C2-09AC2A36BC62}"/>
+              </a:ext>
+            </a:extLst>
+          </p:cNvPr>
+          <p:cNvSpPr>
+            <a:spLocks noGrp="1"/>
+          </p:cNvSpPr>
+          <p:nvPr>
+            <p:ph idx="1"/>
+          </p:nvPr>
+        </p:nvSpPr>
+        <p:spPr/>
+        <p:txBody>
+          <a:bodyPr/>
+          <a:lstStyle/>
+          <a:p>
+            <a:r>
+              <a:rPr lang="en-US" dirty="0"/>
+              <a:t>Hardware: A MacBook Pro, Windows laptop and PC would be used for coding, and a Raspberry Pi would be used to host the API. </a:t>
+            </a:r>
+          </a:p>
+          <a:p>
+            <a:r>
+              <a:rPr lang="en-US" dirty="0"/>
+              <a:t>Software: VS Code would be used as the main code editor due to its performance, flexibility, and useful extensions. Docker would be used during API testing as it makes the process much faster. Android Studio would be used solely for access to Android emulators. GitHub and GitHub Desktop would be used as part of the version control system.</a:t>
+            </a:r>
+          </a:p>
+        </p:txBody>
+      </p:sp>
+    </p:spTree>
+    <p:extLst>
+      <p:ext uri="{BB962C8B-B14F-4D97-AF65-F5344CB8AC3E}">
+        <p14:creationId xmlns:p14="http://schemas.microsoft.com/office/powerpoint/2010/main" val="3134242200"/>
+      </p:ext>
+    </p:extLst>
+  </p:cSld>
+  <p:clrMapOvr>
+    <a:masterClrMapping/>
+  </p:clrMapOvr>
+</p:sld>
+</file>
+
+<file path=ppt/slides/slide11.xml><?xml version="1.0" encoding="utf-8"?>
 <p:sld xmlns:a="http://schemas.openxmlformats.org/drawingml/2006/main" xmlns:r="http://schemas.openxmlformats.org/officeDocument/2006/relationships" xmlns:p="http://schemas.openxmlformats.org/presentationml/2006/main" showMasterSp="0">
   <p:cSld>
     <p:spTree>
@@ -13627,6 +13720,104 @@
           <p:cNvPr id="2" name="Title 1">
             <a:extLst>
               <a:ext uri="{FF2B5EF4-FFF2-40B4-BE49-F238E27FC236}">
+                <a16:creationId xmlns:a16="http://schemas.microsoft.com/office/drawing/2014/main" id="{0A43EB39-03B9-F24B-A087-E0A5D0A81CC2}"/>
+              </a:ext>
+            </a:extLst>
+          </p:cNvPr>
+          <p:cNvSpPr>
+            <a:spLocks noGrp="1"/>
+          </p:cNvSpPr>
+          <p:nvPr>
+            <p:ph type="title"/>
+          </p:nvPr>
+        </p:nvSpPr>
+        <p:spPr/>
+        <p:txBody>
+          <a:bodyPr/>
+          <a:lstStyle/>
+          <a:p>
+            <a:r>
+              <a:rPr lang="en-US" dirty="0"/>
+              <a:t>Architecture</a:t>
+            </a:r>
+          </a:p>
+        </p:txBody>
+      </p:sp>
+      <p:sp>
+        <p:nvSpPr>
+          <p:cNvPr id="3" name="Content Placeholder 2">
+            <a:extLst>
+              <a:ext uri="{FF2B5EF4-FFF2-40B4-BE49-F238E27FC236}">
+                <a16:creationId xmlns:a16="http://schemas.microsoft.com/office/drawing/2014/main" id="{76682C28-85E6-2445-879D-019C9E2985F3}"/>
+              </a:ext>
+            </a:extLst>
+          </p:cNvPr>
+          <p:cNvSpPr>
+            <a:spLocks noGrp="1"/>
+          </p:cNvSpPr>
+          <p:nvPr>
+            <p:ph idx="1"/>
+          </p:nvPr>
+        </p:nvSpPr>
+        <p:spPr/>
+        <p:txBody>
+          <a:bodyPr/>
+          <a:lstStyle/>
+          <a:p>
+            <a:r>
+              <a:rPr lang="en-US" dirty="0"/>
+              <a:t>Server/client, as clients would not interact with one another, and would interact with a GraphQL RESTful API for CRUD functionality.</a:t>
+            </a:r>
+          </a:p>
+          <a:p>
+            <a:r>
+              <a:rPr lang="en-US" dirty="0"/>
+              <a:t>Multi-user support is part of the functionality that CryptoShare aims to provide, and a server/client architecture is ideal for this.</a:t>
+            </a:r>
+          </a:p>
+          <a:p>
+            <a:r>
+              <a:rPr lang="en-US" dirty="0"/>
+              <a:t>The server is self-hosted, with the user having full control over their data.</a:t>
+            </a:r>
+          </a:p>
+        </p:txBody>
+      </p:sp>
+    </p:spTree>
+    <p:extLst>
+      <p:ext uri="{BB962C8B-B14F-4D97-AF65-F5344CB8AC3E}">
+        <p14:creationId xmlns:p14="http://schemas.microsoft.com/office/powerpoint/2010/main" val="2341665580"/>
+      </p:ext>
+    </p:extLst>
+  </p:cSld>
+  <p:clrMapOvr>
+    <a:masterClrMapping/>
+  </p:clrMapOvr>
+</p:sld>
+</file>
+
+<file path=ppt/slides/slide4.xml><?xml version="1.0" encoding="utf-8"?>
+<p:sld xmlns:a="http://schemas.openxmlformats.org/drawingml/2006/main" xmlns:r="http://schemas.openxmlformats.org/officeDocument/2006/relationships" xmlns:p="http://schemas.openxmlformats.org/presentationml/2006/main">
+  <p:cSld>
+    <p:spTree>
+      <p:nvGrpSpPr>
+        <p:cNvPr id="1" name=""/>
+        <p:cNvGrpSpPr/>
+        <p:nvPr/>
+      </p:nvGrpSpPr>
+      <p:grpSpPr>
+        <a:xfrm>
+          <a:off x="0" y="0"/>
+          <a:ext cx="0" cy="0"/>
+          <a:chOff x="0" y="0"/>
+          <a:chExt cx="0" cy="0"/>
+        </a:xfrm>
+      </p:grpSpPr>
+      <p:sp>
+        <p:nvSpPr>
+          <p:cNvPr id="2" name="Title 1">
+            <a:extLst>
+              <a:ext uri="{FF2B5EF4-FFF2-40B4-BE49-F238E27FC236}">
                 <a16:creationId xmlns:a16="http://schemas.microsoft.com/office/drawing/2014/main" id="{3A4953E3-E3BC-C146-BA07-376F826338FA}"/>
               </a:ext>
             </a:extLst>
@@ -13715,7 +13906,7 @@
 </p:sld>
 </file>
 
-<file path=ppt/slides/slide4.xml><?xml version="1.0" encoding="utf-8"?>
+<file path=ppt/slides/slide5.xml><?xml version="1.0" encoding="utf-8"?>
 <p:sld xmlns:a="http://schemas.openxmlformats.org/drawingml/2006/main" xmlns:r="http://schemas.openxmlformats.org/officeDocument/2006/relationships" xmlns:p="http://schemas.openxmlformats.org/presentationml/2006/main">
   <p:cSld>
     <p:spTree>
@@ -13824,7 +14015,7 @@
 </p:sld>
 </file>
 
-<file path=ppt/slides/slide5.xml><?xml version="1.0" encoding="utf-8"?>
+<file path=ppt/slides/slide6.xml><?xml version="1.0" encoding="utf-8"?>
 <p:sld xmlns:a="http://schemas.openxmlformats.org/drawingml/2006/main" xmlns:r="http://schemas.openxmlformats.org/officeDocument/2006/relationships" xmlns:p="http://schemas.openxmlformats.org/presentationml/2006/main">
   <p:cSld>
     <p:spTree>
@@ -13922,7 +14113,7 @@
 </p:sld>
 </file>
 
-<file path=ppt/slides/slide6.xml><?xml version="1.0" encoding="utf-8"?>
+<file path=ppt/slides/slide7.xml><?xml version="1.0" encoding="utf-8"?>
 <p:sld xmlns:a="http://schemas.openxmlformats.org/drawingml/2006/main" xmlns:r="http://schemas.openxmlformats.org/officeDocument/2006/relationships" xmlns:p="http://schemas.openxmlformats.org/presentationml/2006/main">
   <p:cSld>
     <p:spTree>
@@ -14025,7 +14216,7 @@
 </p:sld>
 </file>
 
-<file path=ppt/slides/slide7.xml><?xml version="1.0" encoding="utf-8"?>
+<file path=ppt/slides/slide8.xml><?xml version="1.0" encoding="utf-8"?>
 <p:sld xmlns:a="http://schemas.openxmlformats.org/drawingml/2006/main" xmlns:r="http://schemas.openxmlformats.org/officeDocument/2006/relationships" xmlns:p="http://schemas.openxmlformats.org/presentationml/2006/main">
   <p:cSld>
     <p:spTree>
@@ -14152,7 +14343,7 @@
 </p:sld>
 </file>
 
-<file path=ppt/slides/slide8.xml><?xml version="1.0" encoding="utf-8"?>
+<file path=ppt/slides/slide9.xml><?xml version="1.0" encoding="utf-8"?>
 <p:sld xmlns:a="http://schemas.openxmlformats.org/drawingml/2006/main" xmlns:r="http://schemas.openxmlformats.org/officeDocument/2006/relationships" xmlns:p="http://schemas.openxmlformats.org/presentationml/2006/main">
   <p:cSld>
     <p:spTree>
@@ -14252,98 +14443,6 @@
     <p:extLst>
       <p:ext uri="{BB962C8B-B14F-4D97-AF65-F5344CB8AC3E}">
         <p14:creationId xmlns:p14="http://schemas.microsoft.com/office/powerpoint/2010/main" val="3981294148"/>
-      </p:ext>
-    </p:extLst>
-  </p:cSld>
-  <p:clrMapOvr>
-    <a:masterClrMapping/>
-  </p:clrMapOvr>
-</p:sld>
-</file>
-
-<file path=ppt/slides/slide9.xml><?xml version="1.0" encoding="utf-8"?>
-<p:sld xmlns:a="http://schemas.openxmlformats.org/drawingml/2006/main" xmlns:r="http://schemas.openxmlformats.org/officeDocument/2006/relationships" xmlns:p="http://schemas.openxmlformats.org/presentationml/2006/main">
-  <p:cSld>
-    <p:spTree>
-      <p:nvGrpSpPr>
-        <p:cNvPr id="1" name=""/>
-        <p:cNvGrpSpPr/>
-        <p:nvPr/>
-      </p:nvGrpSpPr>
-      <p:grpSpPr>
-        <a:xfrm>
-          <a:off x="0" y="0"/>
-          <a:ext cx="0" cy="0"/>
-          <a:chOff x="0" y="0"/>
-          <a:chExt cx="0" cy="0"/>
-        </a:xfrm>
-      </p:grpSpPr>
-      <p:sp>
-        <p:nvSpPr>
-          <p:cNvPr id="2" name="Title 1">
-            <a:extLst>
-              <a:ext uri="{FF2B5EF4-FFF2-40B4-BE49-F238E27FC236}">
-                <a16:creationId xmlns:a16="http://schemas.microsoft.com/office/drawing/2014/main" id="{9C19C53D-9C92-A64D-8625-66CF0ABA07FA}"/>
-              </a:ext>
-            </a:extLst>
-          </p:cNvPr>
-          <p:cNvSpPr>
-            <a:spLocks noGrp="1"/>
-          </p:cNvSpPr>
-          <p:nvPr>
-            <p:ph type="title"/>
-          </p:nvPr>
-        </p:nvSpPr>
-        <p:spPr/>
-        <p:txBody>
-          <a:bodyPr/>
-          <a:lstStyle/>
-          <a:p>
-            <a:r>
-              <a:rPr lang="en-US" dirty="0"/>
-              <a:t>Development Environment</a:t>
-            </a:r>
-          </a:p>
-        </p:txBody>
-      </p:sp>
-      <p:sp>
-        <p:nvSpPr>
-          <p:cNvPr id="3" name="Content Placeholder 2">
-            <a:extLst>
-              <a:ext uri="{FF2B5EF4-FFF2-40B4-BE49-F238E27FC236}">
-                <a16:creationId xmlns:a16="http://schemas.microsoft.com/office/drawing/2014/main" id="{ED21F778-FE24-9E4F-87C2-09AC2A36BC62}"/>
-              </a:ext>
-            </a:extLst>
-          </p:cNvPr>
-          <p:cNvSpPr>
-            <a:spLocks noGrp="1"/>
-          </p:cNvSpPr>
-          <p:nvPr>
-            <p:ph idx="1"/>
-          </p:nvPr>
-        </p:nvSpPr>
-        <p:spPr/>
-        <p:txBody>
-          <a:bodyPr/>
-          <a:lstStyle/>
-          <a:p>
-            <a:r>
-              <a:rPr lang="en-US" dirty="0"/>
-              <a:t>Hardware: A MacBook Pro, Windows laptop and PC would be used for coding, and a Raspberry Pi would be used to host the API. </a:t>
-            </a:r>
-          </a:p>
-          <a:p>
-            <a:r>
-              <a:rPr lang="en-US" dirty="0"/>
-              <a:t>Software: VS Code would be used as the main code editor due to its performance, flexibility, and useful extensions. Docker would be used during API testing as it makes the process much faster. Android Studio would be used solely for access to Android emulators. GitHub and GitHub Desktop would be used as part of the version control system.</a:t>
-            </a:r>
-          </a:p>
-        </p:txBody>
-      </p:sp>
-    </p:spTree>
-    <p:extLst>
-      <p:ext uri="{BB962C8B-B14F-4D97-AF65-F5344CB8AC3E}">
-        <p14:creationId xmlns:p14="http://schemas.microsoft.com/office/powerpoint/2010/main" val="3134242200"/>
       </p:ext>
     </p:extLst>
   </p:cSld>

</xml_diff>

<commit_message>
Improved upon the PowerPoint presentation of the third meeting.
</commit_message>
<xml_diff>
--- a/docs/Meetings/3/3.pptx
+++ b/docs/Meetings/3/3.pptx
@@ -13,9 +13,8 @@
     <p:sldId id="260" r:id="rId7"/>
     <p:sldId id="261" r:id="rId8"/>
     <p:sldId id="262" r:id="rId9"/>
-    <p:sldId id="264" r:id="rId10"/>
-    <p:sldId id="263" r:id="rId11"/>
-    <p:sldId id="265" r:id="rId12"/>
+    <p:sldId id="263" r:id="rId10"/>
+    <p:sldId id="265" r:id="rId11"/>
   </p:sldIdLst>
   <p:sldSz cx="12192000" cy="6858000"/>
   <p:notesSz cx="6858000" cy="9144000"/>
@@ -457,7 +456,7 @@
           <a:p>
             <a:fld id="{5930266A-47E2-AD46-80FA-AF9BB5BD36C8}" type="datetimeFigureOut">
               <a:rPr lang="en-US" smtClean="0"/>
-              <a:t>11/18/21</a:t>
+              <a:t>11/18/2021</a:t>
             </a:fld>
             <a:endParaRPr lang="en-US"/>
           </a:p>
@@ -1545,7 +1544,7 @@
           <a:p>
             <a:fld id="{5930266A-47E2-AD46-80FA-AF9BB5BD36C8}" type="datetimeFigureOut">
               <a:rPr lang="en-US" smtClean="0"/>
-              <a:t>11/18/21</a:t>
+              <a:t>11/18/2021</a:t>
             </a:fld>
             <a:endParaRPr lang="en-US"/>
           </a:p>
@@ -2525,7 +2524,7 @@
           <a:p>
             <a:fld id="{5930266A-47E2-AD46-80FA-AF9BB5BD36C8}" type="datetimeFigureOut">
               <a:rPr lang="en-US" smtClean="0"/>
-              <a:t>11/18/21</a:t>
+              <a:t>11/18/2021</a:t>
             </a:fld>
             <a:endParaRPr lang="en-US"/>
           </a:p>
@@ -3659,7 +3658,7 @@
           <a:p>
             <a:fld id="{5930266A-47E2-AD46-80FA-AF9BB5BD36C8}" type="datetimeFigureOut">
               <a:rPr lang="en-US" smtClean="0"/>
-              <a:t>11/18/21</a:t>
+              <a:t>11/18/2021</a:t>
             </a:fld>
             <a:endParaRPr lang="en-US"/>
           </a:p>
@@ -4692,7 +4691,7 @@
           <a:p>
             <a:fld id="{5930266A-47E2-AD46-80FA-AF9BB5BD36C8}" type="datetimeFigureOut">
               <a:rPr lang="en-US" smtClean="0"/>
-              <a:t>11/18/21</a:t>
+              <a:t>11/18/2021</a:t>
             </a:fld>
             <a:endParaRPr lang="en-US"/>
           </a:p>
@@ -5352,7 +5351,7 @@
           <a:p>
             <a:fld id="{5930266A-47E2-AD46-80FA-AF9BB5BD36C8}" type="datetimeFigureOut">
               <a:rPr lang="en-US" smtClean="0"/>
-              <a:t>11/18/21</a:t>
+              <a:t>11/18/2021</a:t>
             </a:fld>
             <a:endParaRPr lang="en-US"/>
           </a:p>
@@ -6213,7 +6212,7 @@
           <a:p>
             <a:fld id="{5930266A-47E2-AD46-80FA-AF9BB5BD36C8}" type="datetimeFigureOut">
               <a:rPr lang="en-US" smtClean="0"/>
-              <a:t>11/18/21</a:t>
+              <a:t>11/18/2021</a:t>
             </a:fld>
             <a:endParaRPr lang="en-US"/>
           </a:p>
@@ -6403,7 +6402,7 @@
           <a:p>
             <a:fld id="{5930266A-47E2-AD46-80FA-AF9BB5BD36C8}" type="datetimeFigureOut">
               <a:rPr lang="en-US" smtClean="0"/>
-              <a:t>11/18/21</a:t>
+              <a:t>11/18/2021</a:t>
             </a:fld>
             <a:endParaRPr lang="en-US"/>
           </a:p>
@@ -7375,7 +7374,7 @@
           <a:p>
             <a:fld id="{5930266A-47E2-AD46-80FA-AF9BB5BD36C8}" type="datetimeFigureOut">
               <a:rPr lang="en-US" smtClean="0"/>
-              <a:t>11/18/21</a:t>
+              <a:t>11/18/2021</a:t>
             </a:fld>
             <a:endParaRPr lang="en-US"/>
           </a:p>
@@ -7586,7 +7585,7 @@
           <a:p>
             <a:fld id="{5930266A-47E2-AD46-80FA-AF9BB5BD36C8}" type="datetimeFigureOut">
               <a:rPr lang="en-US" smtClean="0"/>
-              <a:t>11/18/21</a:t>
+              <a:t>11/18/2021</a:t>
             </a:fld>
             <a:endParaRPr lang="en-US"/>
           </a:p>
@@ -8620,7 +8619,7 @@
           <a:p>
             <a:fld id="{5930266A-47E2-AD46-80FA-AF9BB5BD36C8}" type="datetimeFigureOut">
               <a:rPr lang="en-US" smtClean="0"/>
-              <a:t>11/18/21</a:t>
+              <a:t>11/18/2021</a:t>
             </a:fld>
             <a:endParaRPr lang="en-US"/>
           </a:p>
@@ -8892,7 +8891,7 @@
           <a:p>
             <a:fld id="{5930266A-47E2-AD46-80FA-AF9BB5BD36C8}" type="datetimeFigureOut">
               <a:rPr lang="en-US" smtClean="0"/>
-              <a:t>11/18/21</a:t>
+              <a:t>11/18/2021</a:t>
             </a:fld>
             <a:endParaRPr lang="en-US"/>
           </a:p>
@@ -9302,7 +9301,7 @@
           <a:p>
             <a:fld id="{5930266A-47E2-AD46-80FA-AF9BB5BD36C8}" type="datetimeFigureOut">
               <a:rPr lang="en-US" smtClean="0"/>
-              <a:t>11/18/21</a:t>
+              <a:t>11/18/2021</a:t>
             </a:fld>
             <a:endParaRPr lang="en-US"/>
           </a:p>
@@ -9429,7 +9428,7 @@
           <a:p>
             <a:fld id="{5930266A-47E2-AD46-80FA-AF9BB5BD36C8}" type="datetimeFigureOut">
               <a:rPr lang="en-US" smtClean="0"/>
-              <a:t>11/18/21</a:t>
+              <a:t>11/18/2021</a:t>
             </a:fld>
             <a:endParaRPr lang="en-US"/>
           </a:p>
@@ -9524,7 +9523,7 @@
           <a:p>
             <a:fld id="{5930266A-47E2-AD46-80FA-AF9BB5BD36C8}" type="datetimeFigureOut">
               <a:rPr lang="en-US" smtClean="0"/>
-              <a:t>11/18/21</a:t>
+              <a:t>11/18/2021</a:t>
             </a:fld>
             <a:endParaRPr lang="en-US"/>
           </a:p>
@@ -10605,7 +10604,7 @@
           <a:p>
             <a:fld id="{5930266A-47E2-AD46-80FA-AF9BB5BD36C8}" type="datetimeFigureOut">
               <a:rPr lang="en-US" smtClean="0"/>
-              <a:t>11/18/21</a:t>
+              <a:t>11/18/2021</a:t>
             </a:fld>
             <a:endParaRPr lang="en-US"/>
           </a:p>
@@ -11713,7 +11712,7 @@
           <a:p>
             <a:fld id="{5930266A-47E2-AD46-80FA-AF9BB5BD36C8}" type="datetimeFigureOut">
               <a:rPr lang="en-US" smtClean="0"/>
-              <a:t>11/18/21</a:t>
+              <a:t>11/18/2021</a:t>
             </a:fld>
             <a:endParaRPr lang="en-US"/>
           </a:p>
@@ -12710,7 +12709,7 @@
           <a:p>
             <a:fld id="{5930266A-47E2-AD46-80FA-AF9BB5BD36C8}" type="datetimeFigureOut">
               <a:rPr lang="en-US" smtClean="0"/>
-              <a:t>11/18/21</a:t>
+              <a:t>11/18/2021</a:t>
             </a:fld>
             <a:endParaRPr lang="en-US"/>
           </a:p>
@@ -13339,98 +13338,6 @@
 </file>
 
 <file path=ppt/slides/slide10.xml><?xml version="1.0" encoding="utf-8"?>
-<p:sld xmlns:a="http://schemas.openxmlformats.org/drawingml/2006/main" xmlns:r="http://schemas.openxmlformats.org/officeDocument/2006/relationships" xmlns:p="http://schemas.openxmlformats.org/presentationml/2006/main">
-  <p:cSld>
-    <p:spTree>
-      <p:nvGrpSpPr>
-        <p:cNvPr id="1" name=""/>
-        <p:cNvGrpSpPr/>
-        <p:nvPr/>
-      </p:nvGrpSpPr>
-      <p:grpSpPr>
-        <a:xfrm>
-          <a:off x="0" y="0"/>
-          <a:ext cx="0" cy="0"/>
-          <a:chOff x="0" y="0"/>
-          <a:chExt cx="0" cy="0"/>
-        </a:xfrm>
-      </p:grpSpPr>
-      <p:sp>
-        <p:nvSpPr>
-          <p:cNvPr id="2" name="Title 1">
-            <a:extLst>
-              <a:ext uri="{FF2B5EF4-FFF2-40B4-BE49-F238E27FC236}">
-                <a16:creationId xmlns:a16="http://schemas.microsoft.com/office/drawing/2014/main" id="{9C19C53D-9C92-A64D-8625-66CF0ABA07FA}"/>
-              </a:ext>
-            </a:extLst>
-          </p:cNvPr>
-          <p:cNvSpPr>
-            <a:spLocks noGrp="1"/>
-          </p:cNvSpPr>
-          <p:nvPr>
-            <p:ph type="title"/>
-          </p:nvPr>
-        </p:nvSpPr>
-        <p:spPr/>
-        <p:txBody>
-          <a:bodyPr/>
-          <a:lstStyle/>
-          <a:p>
-            <a:r>
-              <a:rPr lang="en-US" dirty="0"/>
-              <a:t>Development Environment</a:t>
-            </a:r>
-          </a:p>
-        </p:txBody>
-      </p:sp>
-      <p:sp>
-        <p:nvSpPr>
-          <p:cNvPr id="3" name="Content Placeholder 2">
-            <a:extLst>
-              <a:ext uri="{FF2B5EF4-FFF2-40B4-BE49-F238E27FC236}">
-                <a16:creationId xmlns:a16="http://schemas.microsoft.com/office/drawing/2014/main" id="{ED21F778-FE24-9E4F-87C2-09AC2A36BC62}"/>
-              </a:ext>
-            </a:extLst>
-          </p:cNvPr>
-          <p:cNvSpPr>
-            <a:spLocks noGrp="1"/>
-          </p:cNvSpPr>
-          <p:nvPr>
-            <p:ph idx="1"/>
-          </p:nvPr>
-        </p:nvSpPr>
-        <p:spPr/>
-        <p:txBody>
-          <a:bodyPr/>
-          <a:lstStyle/>
-          <a:p>
-            <a:r>
-              <a:rPr lang="en-US" dirty="0"/>
-              <a:t>Hardware: A MacBook Pro, Windows laptop and PC would be used for coding, and a Raspberry Pi would be used to host the API. </a:t>
-            </a:r>
-          </a:p>
-          <a:p>
-            <a:r>
-              <a:rPr lang="en-US" dirty="0"/>
-              <a:t>Software: VS Code would be used as the main code editor due to its performance, flexibility, and useful extensions. Docker would be used during API testing as it makes the process much faster. Android Studio would be used solely for access to Android emulators. GitHub and GitHub Desktop would be used as part of the version control system.</a:t>
-            </a:r>
-          </a:p>
-        </p:txBody>
-      </p:sp>
-    </p:spTree>
-    <p:extLst>
-      <p:ext uri="{BB962C8B-B14F-4D97-AF65-F5344CB8AC3E}">
-        <p14:creationId xmlns:p14="http://schemas.microsoft.com/office/powerpoint/2010/main" val="3134242200"/>
-      </p:ext>
-    </p:extLst>
-  </p:cSld>
-  <p:clrMapOvr>
-    <a:masterClrMapping/>
-  </p:clrMapOvr>
-</p:sld>
-</file>
-
-<file path=ppt/slides/slide11.xml><?xml version="1.0" encoding="utf-8"?>
 <p:sld xmlns:a="http://schemas.openxmlformats.org/drawingml/2006/main" xmlns:r="http://schemas.openxmlformats.org/officeDocument/2006/relationships" xmlns:p="http://schemas.openxmlformats.org/presentationml/2006/main" showMasterSp="0">
   <p:cSld>
     <p:spTree>
@@ -13544,6 +13451,12 @@
           <a:p>
             <a:r>
               <a:rPr lang="en-US" dirty="0"/>
+              <a:t>9 sprints (sprint 0 included).</a:t>
+            </a:r>
+          </a:p>
+          <a:p>
+            <a:r>
+              <a:rPr lang="en-US" dirty="0"/>
               <a:t>2 week sprints.</a:t>
             </a:r>
           </a:p>
@@ -13766,13 +13679,33 @@
           <a:p>
             <a:r>
               <a:rPr lang="en-US" dirty="0"/>
-              <a:t>Server/client, as clients would not interact with one another, and would interact with a GraphQL RESTful API for CRUD functionality.</a:t>
+              <a:t>Client/server, as clients would not interact with one another, and would interact with a GraphQL RESTful API for CRUD functionality.</a:t>
             </a:r>
           </a:p>
           <a:p>
             <a:r>
               <a:rPr lang="en-US" dirty="0"/>
-              <a:t>Multi-user support is part of the functionality that CryptoShare aims to provide, and a server/client architecture is ideal for this.</a:t>
+              <a:t>2 Tier Architecture, with the UI and such being stored on the client’s device, and the API/database being stored on the server.</a:t>
+            </a:r>
+          </a:p>
+          <a:p>
+            <a:r>
+              <a:rPr lang="en-US" dirty="0"/>
+              <a:t>Technically 3 Tier due to </a:t>
+            </a:r>
+            <a:r>
+              <a:rPr lang="en-US" dirty="0" err="1"/>
+              <a:t>GraphQL</a:t>
+            </a:r>
+            <a:r>
+              <a:rPr lang="en-US" dirty="0"/>
+              <a:t>, which acts as middleware between the client and server, handling clients’ specific needs and controlling the data logic to help with performance  and flexibility.</a:t>
+            </a:r>
+          </a:p>
+          <a:p>
+            <a:r>
+              <a:rPr lang="en-US" dirty="0"/>
+              <a:t>Multi-user support is part of the functionality that CryptoShare aims to provide, and a client/server architecture is ideal for this.</a:t>
             </a:r>
           </a:p>
           <a:p>
@@ -13876,13 +13809,13 @@
           <a:p>
             <a:r>
               <a:rPr lang="en-US" dirty="0"/>
-              <a:t>Easy backup procedure for users. </a:t>
+              <a:t>Easy backup procedure for server host. </a:t>
             </a:r>
           </a:p>
           <a:p>
             <a:r>
               <a:rPr lang="en-US" dirty="0"/>
-              <a:t>Server is self-hosted, which means low user traffic, making SQLite an ideal database solution.</a:t>
+              <a:t>Server is self-hosted, which means very low user traffic, making SQLite an ideal database solution.</a:t>
             </a:r>
           </a:p>
           <a:p>
@@ -13970,11 +13903,13 @@
         <p:spPr>
           <a:xfrm>
             <a:off x="1154954" y="2603499"/>
-            <a:ext cx="8825659" cy="3999181"/>
+            <a:ext cx="8825659" cy="4254501"/>
           </a:xfrm>
         </p:spPr>
         <p:txBody>
-          <a:bodyPr/>
+          <a:bodyPr>
+            <a:normAutofit/>
+          </a:bodyPr>
           <a:lstStyle/>
           <a:p>
             <a:r>
@@ -13984,14 +13919,18 @@
           </a:p>
           <a:p>
             <a:r>
-              <a:rPr lang="en-US" dirty="0"/>
-              <a:t>The software has features that utilize web sockets, such as a chat bot. Node.js is ideal for this as the server is always “alive” and allows for real-time, full-duplex data exchange.</a:t>
+              <a:rPr lang="en-US" dirty="0" err="1"/>
+              <a:t>CryptoShare</a:t>
             </a:r>
-          </a:p>
-          <a:p>
             <a:r>
               <a:rPr lang="en-US" dirty="0"/>
-              <a:t>GraphQL allows for incredibly efficient and customizable APIs. Using resolvers and queries, the client can, without modifying server code, decide exactly what pieces of data they want to receive, and have the server omit ones they don’t require. This also increases performance as the server doesn’t even fetch data that isn’t requested. </a:t>
+              <a:t> has features that utilize web sockets, such as a chat bot. Node.js is ideal for this as the server is always “alive” and allows for real-time, full-duplex data exchange.</a:t>
+            </a:r>
+          </a:p>
+          <a:p>
+            <a:r>
+              <a:rPr lang="en-US" dirty="0"/>
+              <a:t>GraphQL allows for incredibly efficient and customizable APIs. Using resolvers and queries, the client can, without modifying server code, decide exactly what pieces of data they want to receive, and have the server omit ones they don’t require without having to create additional endpoints. This also increases performance as the server doesn’t even fetch data that isn’t requested. </a:t>
             </a:r>
           </a:p>
           <a:p>
@@ -14089,7 +14028,7 @@
           <a:p>
             <a:r>
               <a:rPr lang="en-US" dirty="0"/>
-              <a:t>No use of templates, as the custom user interface is a big part of the application. Templates may also not be available for the mobile app, and since the idea is a unified interface for managing ones finances, the design of the platforms need to be uniform.</a:t>
+              <a:t>No use of templates, as the custom user interface is a big part of the application. Templates may also not be available for the mobile app, and since the idea is a unified interface for managing one’s finances, the design of the platforms need to be uniform.</a:t>
             </a:r>
           </a:p>
           <a:p>
@@ -14186,19 +14125,13 @@
           <a:p>
             <a:r>
               <a:rPr lang="en-US" dirty="0"/>
-              <a:t>NeutralinoJS, EJS, CSS, and TypeScript (JS).</a:t>
+              <a:t>NeutralinoJS, HTML, CSS, and TypeScript (JS).</a:t>
             </a:r>
           </a:p>
           <a:p>
             <a:r>
               <a:rPr lang="en-US" dirty="0"/>
               <a:t>NeutralinoJS is a lightweight alternative to Electron, which is a framework used by popular apps such as Discord, GitHub Desktop, Atom etc. to develop desktop applications using web technologies. An Electron app is usually 100MBs or more, whereas NeutralinoJS ones are around 2MBs as Node.js modules cannot be used (in CryptoShare’s case, they aren’t required anyway).</a:t>
-            </a:r>
-          </a:p>
-          <a:p>
-            <a:r>
-              <a:rPr lang="en-US" dirty="0"/>
-              <a:t>EJS is Embedded JavaScript, and allows for PHP-like inline code within HTML code. This allows the NeutralinoJS code to easily modify and pass variables to the front-end.</a:t>
             </a:r>
           </a:p>
         </p:txBody>
@@ -14365,7 +14298,7 @@
           <p:cNvPr id="2" name="Title 1">
             <a:extLst>
               <a:ext uri="{FF2B5EF4-FFF2-40B4-BE49-F238E27FC236}">
-                <a16:creationId xmlns:a16="http://schemas.microsoft.com/office/drawing/2014/main" id="{36E2CF55-5FD0-4449-8157-B86C27E8429F}"/>
+                <a16:creationId xmlns:a16="http://schemas.microsoft.com/office/drawing/2014/main" id="{9C19C53D-9C92-A64D-8625-66CF0ABA07FA}"/>
               </a:ext>
             </a:extLst>
           </p:cNvPr>
@@ -14383,7 +14316,7 @@
           <a:p>
             <a:r>
               <a:rPr lang="en-US" dirty="0"/>
-              <a:t>Testing</a:t>
+              <a:t>Development Environment</a:t>
             </a:r>
           </a:p>
         </p:txBody>
@@ -14393,7 +14326,7 @@
           <p:cNvPr id="3" name="Content Placeholder 2">
             <a:extLst>
               <a:ext uri="{FF2B5EF4-FFF2-40B4-BE49-F238E27FC236}">
-                <a16:creationId xmlns:a16="http://schemas.microsoft.com/office/drawing/2014/main" id="{23476339-6A7D-9345-9E7E-AD1313AB2D9E}"/>
+                <a16:creationId xmlns:a16="http://schemas.microsoft.com/office/drawing/2014/main" id="{ED21F778-FE24-9E4F-87C2-09AC2A36BC62}"/>
               </a:ext>
             </a:extLst>
           </p:cNvPr>
@@ -14404,37 +14337,20 @@
             <p:ph idx="1"/>
           </p:nvPr>
         </p:nvSpPr>
-        <p:spPr>
-          <a:xfrm>
-            <a:off x="1154954" y="2603499"/>
-            <a:ext cx="8825659" cy="4094183"/>
-          </a:xfrm>
-        </p:spPr>
+        <p:spPr/>
         <p:txBody>
           <a:bodyPr/>
           <a:lstStyle/>
           <a:p>
             <a:r>
               <a:rPr lang="en-US" dirty="0"/>
-              <a:t>Since JS is used as the main programming language, most of the testing would be done using Jest.</a:t>
+              <a:t>Hardware: A MacBook Pro, Windows laptop and PC would be used for coding, and a Raspberry Pi would be used to host the API. </a:t>
             </a:r>
           </a:p>
           <a:p>
             <a:r>
               <a:rPr lang="en-US" dirty="0"/>
-              <a:t>In terms of hardware, a PC running Windows and Linux would be used to test the desktop app. A 2021 MacBook Pro would be used to test the macOS desktop app and its compatibility with Apple Silicon. A 2015 MacBook Pro would be used to test the macOS app without Apple Silicon. Two Android phones would be used to test the mobile app on physical devices (one with a notch, one without), and Android emulators would be used to test it on different Android OS versions. The web app would be tested using different display sizes (including mobile) to ensure responsiveness. </a:t>
-            </a:r>
-          </a:p>
-          <a:p>
-            <a:r>
-              <a:rPr lang="en-US" dirty="0"/>
-              <a:t>Web Accessibility testing would also be carried out.</a:t>
-            </a:r>
-          </a:p>
-          <a:p>
-            <a:r>
-              <a:rPr lang="en-US" dirty="0"/>
-              <a:t>GitHub Actions would be used for Continuous Integration.</a:t>
+              <a:t>Software: VS Code would be used as the main code editor due to its performance, flexibility, and useful extensions. Docker would be used during API testing as it makes the process much faster. Android Studio would be used solely for access to Android emulators. GitHub and GitHub Desktop would be used as part of the version control system.</a:t>
             </a:r>
           </a:p>
         </p:txBody>
@@ -14442,7 +14358,7 @@
     </p:spTree>
     <p:extLst>
       <p:ext uri="{BB962C8B-B14F-4D97-AF65-F5344CB8AC3E}">
-        <p14:creationId xmlns:p14="http://schemas.microsoft.com/office/powerpoint/2010/main" val="3981294148"/>
+        <p14:creationId xmlns:p14="http://schemas.microsoft.com/office/powerpoint/2010/main" val="3134242200"/>
       </p:ext>
     </p:extLst>
   </p:cSld>

</xml_diff>